<commit_message>
Updated handouts for classes and pointers
</commit_message>
<xml_diff>
--- a/- Slides/CS301_Bootcamp_Pointers.pptx
+++ b/- Slides/CS301_Bootcamp_Pointers.pptx
@@ -258,7 +258,7 @@
           <a:p>
             <a:fld id="{4081F25B-69AE-4903-8504-5228045AD135}" type="datetimeFigureOut">
               <a:rPr lang="en-US" smtClean="0"/>
-              <a:t>12/17/2022</a:t>
+              <a:t>8/16/2023</a:t>
             </a:fld>
             <a:endParaRPr lang="en-US"/>
           </a:p>
@@ -3937,7 +3937,7 @@
           <a:p>
             <a:fld id="{EC5A0E46-DF2F-4CF0-B206-42CD27B775C6}" type="datetimeFigureOut">
               <a:rPr lang="en-US" smtClean="0"/>
-              <a:t>12/17/2022</a:t>
+              <a:t>8/16/2023</a:t>
             </a:fld>
             <a:endParaRPr lang="en-US"/>
           </a:p>
@@ -4171,7 +4171,7 @@
           <a:p>
             <a:fld id="{EC5A0E46-DF2F-4CF0-B206-42CD27B775C6}" type="datetimeFigureOut">
               <a:rPr lang="en-US" smtClean="0"/>
-              <a:t>12/17/2022</a:t>
+              <a:t>8/16/2023</a:t>
             </a:fld>
             <a:endParaRPr lang="en-US"/>
           </a:p>
@@ -4379,7 +4379,7 @@
           <a:p>
             <a:fld id="{EC5A0E46-DF2F-4CF0-B206-42CD27B775C6}" type="datetimeFigureOut">
               <a:rPr lang="en-US" smtClean="0"/>
-              <a:t>12/17/2022</a:t>
+              <a:t>8/16/2023</a:t>
             </a:fld>
             <a:endParaRPr lang="en-US"/>
           </a:p>
@@ -4587,7 +4587,7 @@
           <a:p>
             <a:fld id="{EC5A0E46-DF2F-4CF0-B206-42CD27B775C6}" type="datetimeFigureOut">
               <a:rPr lang="en-US" smtClean="0"/>
-              <a:t>12/17/2022</a:t>
+              <a:t>8/16/2023</a:t>
             </a:fld>
             <a:endParaRPr lang="en-US"/>
           </a:p>
@@ -4862,7 +4862,7 @@
           <a:p>
             <a:fld id="{EC5A0E46-DF2F-4CF0-B206-42CD27B775C6}" type="datetimeFigureOut">
               <a:rPr lang="en-US" smtClean="0"/>
-              <a:t>12/17/2022</a:t>
+              <a:t>8/16/2023</a:t>
             </a:fld>
             <a:endParaRPr lang="en-US"/>
           </a:p>
@@ -5132,7 +5132,7 @@
           <a:p>
             <a:fld id="{EC5A0E46-DF2F-4CF0-B206-42CD27B775C6}" type="datetimeFigureOut">
               <a:rPr lang="en-US" smtClean="0"/>
-              <a:t>12/17/2022</a:t>
+              <a:t>8/16/2023</a:t>
             </a:fld>
             <a:endParaRPr lang="en-US"/>
           </a:p>
@@ -5544,7 +5544,7 @@
           <a:p>
             <a:fld id="{EC5A0E46-DF2F-4CF0-B206-42CD27B775C6}" type="datetimeFigureOut">
               <a:rPr lang="en-US" smtClean="0"/>
-              <a:t>12/17/2022</a:t>
+              <a:t>8/16/2023</a:t>
             </a:fld>
             <a:endParaRPr lang="en-US"/>
           </a:p>
@@ -5685,7 +5685,7 @@
           <a:p>
             <a:fld id="{EC5A0E46-DF2F-4CF0-B206-42CD27B775C6}" type="datetimeFigureOut">
               <a:rPr lang="en-US" smtClean="0"/>
-              <a:t>12/17/2022</a:t>
+              <a:t>8/16/2023</a:t>
             </a:fld>
             <a:endParaRPr lang="en-US"/>
           </a:p>
@@ -5798,7 +5798,7 @@
           <a:p>
             <a:fld id="{EC5A0E46-DF2F-4CF0-B206-42CD27B775C6}" type="datetimeFigureOut">
               <a:rPr lang="en-US" smtClean="0"/>
-              <a:t>12/17/2022</a:t>
+              <a:t>8/16/2023</a:t>
             </a:fld>
             <a:endParaRPr lang="en-US"/>
           </a:p>
@@ -6109,7 +6109,7 @@
           <a:p>
             <a:fld id="{EC5A0E46-DF2F-4CF0-B206-42CD27B775C6}" type="datetimeFigureOut">
               <a:rPr lang="en-US" smtClean="0"/>
-              <a:t>12/17/2022</a:t>
+              <a:t>8/16/2023</a:t>
             </a:fld>
             <a:endParaRPr lang="en-US"/>
           </a:p>
@@ -6397,7 +6397,7 @@
           <a:p>
             <a:fld id="{EC5A0E46-DF2F-4CF0-B206-42CD27B775C6}" type="datetimeFigureOut">
               <a:rPr lang="en-US" smtClean="0"/>
-              <a:t>12/17/2022</a:t>
+              <a:t>8/16/2023</a:t>
             </a:fld>
             <a:endParaRPr lang="en-US"/>
           </a:p>
@@ -6638,7 +6638,7 @@
           <a:p>
             <a:fld id="{EC5A0E46-DF2F-4CF0-B206-42CD27B775C6}" type="datetimeFigureOut">
               <a:rPr lang="en-US" smtClean="0"/>
-              <a:t>12/17/2022</a:t>
+              <a:t>8/16/2023</a:t>
             </a:fld>
             <a:endParaRPr lang="en-US"/>
           </a:p>
@@ -7079,16 +7079,8 @@
           <a:lstStyle/>
           <a:p>
             <a:r>
-              <a:rPr lang="en-US" sz="4400" spc="-35" dirty="0" err="1"/>
-              <a:t>Ifstream</a:t>
-            </a:r>
-            <a:r>
               <a:rPr lang="en-US" sz="4400" spc="-35" dirty="0"/>
-              <a:t>, </a:t>
-            </a:r>
-            <a:r>
-              <a:rPr lang="en-US" sz="4400" spc="-35" dirty="0" err="1"/>
-              <a:t>ofstream</a:t>
+              <a:t>Pointer Practice</a:t>
             </a:r>
             <a:endParaRPr lang="en-US" sz="4400" dirty="0"/>
           </a:p>
@@ -9725,8 +9717,12 @@
           <a:lstStyle/>
           <a:p>
             <a:r>
+              <a:rPr lang="en-US"/>
+              <a:t>Recall: Variables </a:t>
+            </a:r>
+            <a:r>
               <a:rPr lang="en-US" dirty="0"/>
-              <a:t>Recall from week 1: Variables and memory</a:t>
+              <a:t>and memory</a:t>
             </a:r>
           </a:p>
         </p:txBody>

</xml_diff>